<commit_message>
Update Sequence diagrams for open & new
</commit_message>
<xml_diff>
--- a/docs/diagrams/OpenNewHighLevelSequenceDiagrams.pptx
+++ b/docs/diagrams/OpenNewHighLevelSequenceDiagrams.pptx
@@ -209,7 +209,7 @@
           <a:p>
             <a:fld id="{F5CC4B3F-88C1-4FFA-B1B6-F41C21DC6924}" type="datetimeFigureOut">
               <a:rPr lang="en-US" smtClean="0"/>
-              <a:t>21/10/2017</a:t>
+              <a:t>23/10/2017</a:t>
             </a:fld>
             <a:endParaRPr lang="en-US"/>
           </a:p>
@@ -477,6 +477,90 @@
 </p:notesMaster>
 </file>
 
+<file path=ppt/notesSlides/notesSlide1.xml><?xml version="1.0" encoding="utf-8"?>
+<p:notes xmlns:a="http://schemas.openxmlformats.org/drawingml/2006/main" xmlns:r="http://schemas.openxmlformats.org/officeDocument/2006/relationships" xmlns:p="http://schemas.openxmlformats.org/presentationml/2006/main">
+  <p:cSld>
+    <p:spTree>
+      <p:nvGrpSpPr>
+        <p:cNvPr id="1" name=""/>
+        <p:cNvGrpSpPr/>
+        <p:nvPr/>
+      </p:nvGrpSpPr>
+      <p:grpSpPr>
+        <a:xfrm>
+          <a:off x="0" y="0"/>
+          <a:ext cx="0" cy="0"/>
+          <a:chOff x="0" y="0"/>
+          <a:chExt cx="0" cy="0"/>
+        </a:xfrm>
+      </p:grpSpPr>
+      <p:sp>
+        <p:nvSpPr>
+          <p:cNvPr id="2" name="Slide Image Placeholder 1"/>
+          <p:cNvSpPr>
+            <a:spLocks noGrp="1" noRot="1" noChangeAspect="1"/>
+          </p:cNvSpPr>
+          <p:nvPr>
+            <p:ph type="sldImg"/>
+          </p:nvPr>
+        </p:nvSpPr>
+        <p:spPr/>
+      </p:sp>
+      <p:sp>
+        <p:nvSpPr>
+          <p:cNvPr id="3" name="Notes Placeholder 2"/>
+          <p:cNvSpPr>
+            <a:spLocks noGrp="1"/>
+          </p:cNvSpPr>
+          <p:nvPr>
+            <p:ph type="body" idx="1"/>
+          </p:nvPr>
+        </p:nvSpPr>
+        <p:spPr/>
+        <p:txBody>
+          <a:bodyPr/>
+          <a:lstStyle/>
+          <a:p>
+            <a:endParaRPr lang="en-GB" dirty="0"/>
+          </a:p>
+        </p:txBody>
+      </p:sp>
+      <p:sp>
+        <p:nvSpPr>
+          <p:cNvPr id="4" name="Slide Number Placeholder 3"/>
+          <p:cNvSpPr>
+            <a:spLocks noGrp="1"/>
+          </p:cNvSpPr>
+          <p:nvPr>
+            <p:ph type="sldNum" sz="quarter" idx="10"/>
+          </p:nvPr>
+        </p:nvSpPr>
+        <p:spPr/>
+        <p:txBody>
+          <a:bodyPr/>
+          <a:lstStyle/>
+          <a:p>
+            <a:fld id="{5A7AB025-77E3-4BD1-A2FD-B3183DBA47A3}" type="slidenum">
+              <a:rPr lang="en-US" smtClean="0"/>
+              <a:t>2</a:t>
+            </a:fld>
+            <a:endParaRPr lang="en-US"/>
+          </a:p>
+        </p:txBody>
+      </p:sp>
+    </p:spTree>
+    <p:extLst>
+      <p:ext uri="{BB962C8B-B14F-4D97-AF65-F5344CB8AC3E}">
+        <p14:creationId xmlns:p14="http://schemas.microsoft.com/office/powerpoint/2010/main" val="2454265435"/>
+      </p:ext>
+    </p:extLst>
+  </p:cSld>
+  <p:clrMapOvr>
+    <a:masterClrMapping/>
+  </p:clrMapOvr>
+</p:notes>
+</file>
+
 <file path=ppt/slideLayouts/slideLayout1.xml><?xml version="1.0" encoding="utf-8"?>
 <p:sldLayout xmlns:a="http://schemas.openxmlformats.org/drawingml/2006/main" xmlns:r="http://schemas.openxmlformats.org/officeDocument/2006/relationships" xmlns:p="http://schemas.openxmlformats.org/presentationml/2006/main" type="title" preserve="1">
   <p:cSld name="Title Slide">
@@ -658,7 +742,7 @@
           <a:p>
             <a:fld id="{78C97017-6FC3-485B-9764-EAC9E56C1D49}" type="datetimeFigureOut">
               <a:rPr lang="en-US" smtClean="0"/>
-              <a:t>21/10/2017</a:t>
+              <a:t>23/10/2017</a:t>
             </a:fld>
             <a:endParaRPr lang="en-US"/>
           </a:p>
@@ -828,7 +912,7 @@
           <a:p>
             <a:fld id="{78C97017-6FC3-485B-9764-EAC9E56C1D49}" type="datetimeFigureOut">
               <a:rPr lang="en-US" smtClean="0"/>
-              <a:t>21/10/2017</a:t>
+              <a:t>23/10/2017</a:t>
             </a:fld>
             <a:endParaRPr lang="en-US"/>
           </a:p>
@@ -1008,7 +1092,7 @@
           <a:p>
             <a:fld id="{78C97017-6FC3-485B-9764-EAC9E56C1D49}" type="datetimeFigureOut">
               <a:rPr lang="en-US" smtClean="0"/>
-              <a:t>21/10/2017</a:t>
+              <a:t>23/10/2017</a:t>
             </a:fld>
             <a:endParaRPr lang="en-US"/>
           </a:p>
@@ -1178,7 +1262,7 @@
           <a:p>
             <a:fld id="{78C97017-6FC3-485B-9764-EAC9E56C1D49}" type="datetimeFigureOut">
               <a:rPr lang="en-US" smtClean="0"/>
-              <a:t>21/10/2017</a:t>
+              <a:t>23/10/2017</a:t>
             </a:fld>
             <a:endParaRPr lang="en-US"/>
           </a:p>
@@ -1424,7 +1508,7 @@
           <a:p>
             <a:fld id="{78C97017-6FC3-485B-9764-EAC9E56C1D49}" type="datetimeFigureOut">
               <a:rPr lang="en-US" smtClean="0"/>
-              <a:t>21/10/2017</a:t>
+              <a:t>23/10/2017</a:t>
             </a:fld>
             <a:endParaRPr lang="en-US"/>
           </a:p>
@@ -1712,7 +1796,7 @@
           <a:p>
             <a:fld id="{78C97017-6FC3-485B-9764-EAC9E56C1D49}" type="datetimeFigureOut">
               <a:rPr lang="en-US" smtClean="0"/>
-              <a:t>21/10/2017</a:t>
+              <a:t>23/10/2017</a:t>
             </a:fld>
             <a:endParaRPr lang="en-US"/>
           </a:p>
@@ -2134,7 +2218,7 @@
           <a:p>
             <a:fld id="{78C97017-6FC3-485B-9764-EAC9E56C1D49}" type="datetimeFigureOut">
               <a:rPr lang="en-US" smtClean="0"/>
-              <a:t>21/10/2017</a:t>
+              <a:t>23/10/2017</a:t>
             </a:fld>
             <a:endParaRPr lang="en-US"/>
           </a:p>
@@ -2252,7 +2336,7 @@
           <a:p>
             <a:fld id="{78C97017-6FC3-485B-9764-EAC9E56C1D49}" type="datetimeFigureOut">
               <a:rPr lang="en-US" smtClean="0"/>
-              <a:t>21/10/2017</a:t>
+              <a:t>23/10/2017</a:t>
             </a:fld>
             <a:endParaRPr lang="en-US"/>
           </a:p>
@@ -2347,7 +2431,7 @@
           <a:p>
             <a:fld id="{78C97017-6FC3-485B-9764-EAC9E56C1D49}" type="datetimeFigureOut">
               <a:rPr lang="en-US" smtClean="0"/>
-              <a:t>21/10/2017</a:t>
+              <a:t>23/10/2017</a:t>
             </a:fld>
             <a:endParaRPr lang="en-US"/>
           </a:p>
@@ -2624,7 +2708,7 @@
           <a:p>
             <a:fld id="{78C97017-6FC3-485B-9764-EAC9E56C1D49}" type="datetimeFigureOut">
               <a:rPr lang="en-US" smtClean="0"/>
-              <a:t>21/10/2017</a:t>
+              <a:t>23/10/2017</a:t>
             </a:fld>
             <a:endParaRPr lang="en-US"/>
           </a:p>
@@ -2877,7 +2961,7 @@
           <a:p>
             <a:fld id="{78C97017-6FC3-485B-9764-EAC9E56C1D49}" type="datetimeFigureOut">
               <a:rPr lang="en-US" smtClean="0"/>
-              <a:t>21/10/2017</a:t>
+              <a:t>23/10/2017</a:t>
             </a:fld>
             <a:endParaRPr lang="en-US"/>
           </a:p>
@@ -3090,7 +3174,7 @@
           <a:p>
             <a:fld id="{78C97017-6FC3-485B-9764-EAC9E56C1D49}" type="datetimeFigureOut">
               <a:rPr lang="en-US" smtClean="0"/>
-              <a:t>21/10/2017</a:t>
+              <a:t>23/10/2017</a:t>
             </a:fld>
             <a:endParaRPr lang="en-US"/>
           </a:p>
@@ -4156,7 +4240,7 @@
         </p:nvSpPr>
         <p:spPr>
           <a:xfrm>
-            <a:off x="4087032" y="1704331"/>
+            <a:off x="4087032" y="1859018"/>
             <a:ext cx="2438400" cy="215444"/>
           </a:xfrm>
           <a:prstGeom prst="rect">
@@ -4200,13 +4284,6 @@
               </a:rPr>
               <a:t>)</a:t>
             </a:r>
-            <a:endParaRPr lang="en-US" sz="1400" dirty="0">
-              <a:solidFill>
-                <a:schemeClr val="accent5">
-                  <a:lumMod val="75000"/>
-                </a:schemeClr>
-              </a:solidFill>
-            </a:endParaRPr>
           </a:p>
         </p:txBody>
       </p:sp>
@@ -4459,7 +4536,7 @@
         </p:nvCxnSpPr>
         <p:spPr>
           <a:xfrm>
-            <a:off x="3956994" y="1977877"/>
+            <a:off x="3956994" y="1797546"/>
             <a:ext cx="2568438" cy="0"/>
           </a:xfrm>
           <a:prstGeom prst="straightConnector1">
@@ -4535,7 +4612,7 @@
         </p:nvSpPr>
         <p:spPr>
           <a:xfrm>
-            <a:off x="2059739" y="4652498"/>
+            <a:off x="2059739" y="4983635"/>
             <a:ext cx="2716635" cy="215444"/>
           </a:xfrm>
           <a:prstGeom prst="rect">
@@ -4971,7 +5048,7 @@
         </p:nvCxnSpPr>
         <p:spPr>
           <a:xfrm flipH="1" flipV="1">
-            <a:off x="4778385" y="5760908"/>
+            <a:off x="4778385" y="5791200"/>
             <a:ext cx="3142485" cy="13331"/>
           </a:xfrm>
           <a:prstGeom prst="straightConnector1">
@@ -4979,9 +5056,7 @@
           </a:prstGeom>
           <a:ln w="19050">
             <a:solidFill>
-              <a:schemeClr val="accent5">
-                <a:lumMod val="75000"/>
-              </a:schemeClr>
+              <a:srgbClr val="7030A0"/>
             </a:solidFill>
             <a:prstDash val="sysDash"/>
             <a:tailEnd type="arrow"/>
@@ -5061,7 +5136,7 @@
         </p:nvSpPr>
         <p:spPr>
           <a:xfrm>
-            <a:off x="4877939" y="5216751"/>
+            <a:off x="4877939" y="5306274"/>
             <a:ext cx="3047276" cy="215444"/>
           </a:xfrm>
           <a:prstGeom prst="rect">
@@ -5102,7 +5177,7 @@
         </p:nvCxnSpPr>
         <p:spPr>
           <a:xfrm flipH="1">
-            <a:off x="4786375" y="5496050"/>
+            <a:off x="4786375" y="5232299"/>
             <a:ext cx="3138843" cy="0"/>
           </a:xfrm>
           <a:prstGeom prst="straightConnector1">
@@ -5110,7 +5185,9 @@
           </a:prstGeom>
           <a:ln w="19050">
             <a:solidFill>
-              <a:srgbClr val="7030A0"/>
+              <a:schemeClr val="accent5">
+                <a:lumMod val="75000"/>
+              </a:schemeClr>
             </a:solidFill>
             <a:prstDash val="solid"/>
             <a:headEnd type="arrow" w="med" len="med"/>
@@ -5752,7 +5829,7 @@
         </p:nvSpPr>
         <p:spPr>
           <a:xfrm>
-            <a:off x="814194" y="996828"/>
+            <a:off x="792745" y="930413"/>
             <a:ext cx="1752600" cy="215444"/>
           </a:xfrm>
           <a:prstGeom prst="rect">
@@ -5790,7 +5867,7 @@
         </p:nvSpPr>
         <p:spPr>
           <a:xfrm>
-            <a:off x="1011743" y="1297562"/>
+            <a:off x="1040161" y="1519448"/>
             <a:ext cx="2438400" cy="184666"/>
           </a:xfrm>
           <a:prstGeom prst="rect">
@@ -5834,13 +5911,6 @@
               </a:rPr>
               <a:t>)</a:t>
             </a:r>
-            <a:endParaRPr lang="en-US" sz="1200" dirty="0">
-              <a:solidFill>
-                <a:schemeClr val="accent5">
-                  <a:lumMod val="75000"/>
-                </a:schemeClr>
-              </a:solidFill>
-            </a:endParaRPr>
           </a:p>
         </p:txBody>
       </p:sp>
@@ -5978,7 +6048,7 @@
         </p:nvCxnSpPr>
         <p:spPr>
           <a:xfrm>
-            <a:off x="881705" y="1571108"/>
+            <a:off x="881705" y="1447800"/>
             <a:ext cx="2568438" cy="0"/>
           </a:xfrm>
           <a:prstGeom prst="straightConnector1">
@@ -6014,7 +6084,7 @@
         </p:nvCxnSpPr>
         <p:spPr>
           <a:xfrm>
-            <a:off x="881705" y="1747895"/>
+            <a:off x="881705" y="1828800"/>
             <a:ext cx="2549946" cy="0"/>
           </a:xfrm>
           <a:prstGeom prst="straightConnector1">
@@ -6354,7 +6424,7 @@
         </p:nvSpPr>
         <p:spPr>
           <a:xfrm flipH="1">
-            <a:off x="3689088" y="1244345"/>
+            <a:off x="3715518" y="1537343"/>
             <a:ext cx="2974998" cy="215444"/>
           </a:xfrm>
           <a:prstGeom prst="rect">
@@ -6384,11 +6454,6 @@
               </a:rPr>
               <a:t>()</a:t>
             </a:r>
-            <a:endParaRPr lang="en-US" sz="1400" dirty="0">
-              <a:solidFill>
-                <a:srgbClr val="00B050"/>
-              </a:solidFill>
-            </a:endParaRPr>
           </a:p>
         </p:txBody>
       </p:sp>
@@ -6589,30 +6654,6 @@
           </a:p>
         </p:txBody>
       </p:sp>
-      <p:pic>
-        <p:nvPicPr>
-          <p:cNvPr id="63" name="Picture 62"/>
-          <p:cNvPicPr>
-            <a:picLocks noChangeAspect="1"/>
-          </p:cNvPicPr>
-          <p:nvPr/>
-        </p:nvPicPr>
-        <p:blipFill>
-          <a:blip r:embed="rId2"/>
-          <a:stretch>
-            <a:fillRect/>
-          </a:stretch>
-        </p:blipFill>
-        <p:spPr>
-          <a:xfrm>
-            <a:off x="656990" y="3933669"/>
-            <a:ext cx="7773074" cy="2347163"/>
-          </a:xfrm>
-          <a:prstGeom prst="rect">
-            <a:avLst/>
-          </a:prstGeom>
-        </p:spPr>
-      </p:pic>
     </p:spTree>
     <p:extLst>
       <p:ext uri="{BB962C8B-B14F-4D97-AF65-F5344CB8AC3E}">

</xml_diff>